<commit_message>
pres update for meeting
</commit_message>
<xml_diff>
--- a/7330 Twitter data project Presentation.pptx
+++ b/7330 Twitter data project Presentation.pptx
@@ -9,10 +9,11 @@
     <p:sldId id="257" r:id="rId3"/>
     <p:sldId id="258" r:id="rId4"/>
     <p:sldId id="260" r:id="rId5"/>
-    <p:sldId id="259" r:id="rId6"/>
-    <p:sldId id="262" r:id="rId7"/>
-    <p:sldId id="261" r:id="rId8"/>
-    <p:sldId id="263" r:id="rId9"/>
+    <p:sldId id="262" r:id="rId6"/>
+    <p:sldId id="261" r:id="rId7"/>
+    <p:sldId id="264" r:id="rId8"/>
+    <p:sldId id="259" r:id="rId9"/>
+    <p:sldId id="263" r:id="rId10"/>
   </p:sldIdLst>
   <p:sldSz cx="12192000" cy="6858000"/>
   <p:notesSz cx="6858000" cy="9144000"/>
@@ -169,7 +170,7 @@
           <a:noFill/>
           <a:extLst>
             <a:ext uri="{909E8E84-426E-40dd-AFC4-6F175D3DCCD1}">
-              <a14:hiddenFill xmlns:a14="http://schemas.microsoft.com/office/drawing/2010/main" xmlns="">
+              <a14:hiddenFill xmlns="" xmlns:a14="http://schemas.microsoft.com/office/drawing/2010/main">
                 <a:solidFill>
                   <a:srgbClr val="FFFFFF"/>
                 </a:solidFill>
@@ -229,7 +230,7 @@
             </a:ln>
             <a:extLst>
               <a:ext uri="{91240B29-F687-4f45-9708-019B960494DF}">
-                <a14:hiddenLine xmlns:a14="http://schemas.microsoft.com/office/drawing/2010/main" xmlns="" w="9525">
+                <a14:hiddenLine xmlns="" xmlns:a14="http://schemas.microsoft.com/office/drawing/2010/main" w="9525">
                   <a:solidFill>
                     <a:srgbClr val="000000"/>
                   </a:solidFill>
@@ -319,7 +320,7 @@
             </a:ln>
             <a:extLst>
               <a:ext uri="{91240B29-F687-4f45-9708-019B960494DF}">
-                <a14:hiddenLine xmlns:a14="http://schemas.microsoft.com/office/drawing/2010/main" xmlns="" w="9525">
+                <a14:hiddenLine xmlns="" xmlns:a14="http://schemas.microsoft.com/office/drawing/2010/main" w="9525">
                   <a:solidFill>
                     <a:srgbClr val="000000"/>
                   </a:solidFill>
@@ -409,7 +410,7 @@
             </a:ln>
             <a:extLst>
               <a:ext uri="{91240B29-F687-4f45-9708-019B960494DF}">
-                <a14:hiddenLine xmlns:a14="http://schemas.microsoft.com/office/drawing/2010/main" xmlns="" w="9525">
+                <a14:hiddenLine xmlns="" xmlns:a14="http://schemas.microsoft.com/office/drawing/2010/main" w="9525">
                   <a:solidFill>
                     <a:srgbClr val="000000"/>
                   </a:solidFill>
@@ -443,7 +444,7 @@
             </a:ln>
             <a:extLst>
               <a:ext uri="{91240B29-F687-4f45-9708-019B960494DF}">
-                <a14:hiddenLine xmlns:a14="http://schemas.microsoft.com/office/drawing/2010/main" xmlns="" w="9525">
+                <a14:hiddenLine xmlns="" xmlns:a14="http://schemas.microsoft.com/office/drawing/2010/main" w="9525">
                   <a:solidFill>
                     <a:srgbClr val="000000"/>
                   </a:solidFill>
@@ -533,7 +534,7 @@
             </a:ln>
             <a:extLst>
               <a:ext uri="{91240B29-F687-4f45-9708-019B960494DF}">
-                <a14:hiddenLine xmlns:a14="http://schemas.microsoft.com/office/drawing/2010/main" xmlns="" w="9525">
+                <a14:hiddenLine xmlns="" xmlns:a14="http://schemas.microsoft.com/office/drawing/2010/main" w="9525">
                   <a:solidFill>
                     <a:srgbClr val="000000"/>
                   </a:solidFill>
@@ -595,7 +596,7 @@
             </a:ln>
             <a:extLst>
               <a:ext uri="{91240B29-F687-4f45-9708-019B960494DF}">
-                <a14:hiddenLine xmlns:a14="http://schemas.microsoft.com/office/drawing/2010/main" xmlns="" w="9525">
+                <a14:hiddenLine xmlns="" xmlns:a14="http://schemas.microsoft.com/office/drawing/2010/main" w="9525">
                   <a:solidFill>
                     <a:srgbClr val="000000"/>
                   </a:solidFill>
@@ -657,7 +658,7 @@
             </a:ln>
             <a:extLst>
               <a:ext uri="{91240B29-F687-4f45-9708-019B960494DF}">
-                <a14:hiddenLine xmlns:a14="http://schemas.microsoft.com/office/drawing/2010/main" xmlns="" w="9525">
+                <a14:hiddenLine xmlns="" xmlns:a14="http://schemas.microsoft.com/office/drawing/2010/main" w="9525">
                   <a:solidFill>
                     <a:srgbClr val="000000"/>
                   </a:solidFill>
@@ -747,7 +748,7 @@
             </a:ln>
             <a:extLst>
               <a:ext uri="{91240B29-F687-4f45-9708-019B960494DF}">
-                <a14:hiddenLine xmlns:a14="http://schemas.microsoft.com/office/drawing/2010/main" xmlns="" w="9525">
+                <a14:hiddenLine xmlns="" xmlns:a14="http://schemas.microsoft.com/office/drawing/2010/main" w="9525">
                   <a:solidFill>
                     <a:srgbClr val="000000"/>
                   </a:solidFill>
@@ -809,7 +810,7 @@
             </a:ln>
             <a:extLst>
               <a:ext uri="{91240B29-F687-4f45-9708-019B960494DF}">
-                <a14:hiddenLine xmlns:a14="http://schemas.microsoft.com/office/drawing/2010/main" xmlns="" w="9525">
+                <a14:hiddenLine xmlns="" xmlns:a14="http://schemas.microsoft.com/office/drawing/2010/main" w="9525">
                   <a:solidFill>
                     <a:srgbClr val="000000"/>
                   </a:solidFill>
@@ -871,7 +872,7 @@
             </a:ln>
             <a:extLst>
               <a:ext uri="{91240B29-F687-4f45-9708-019B960494DF}">
-                <a14:hiddenLine xmlns:a14="http://schemas.microsoft.com/office/drawing/2010/main" xmlns="" w="9525">
+                <a14:hiddenLine xmlns="" xmlns:a14="http://schemas.microsoft.com/office/drawing/2010/main" w="9525">
                   <a:solidFill>
                     <a:srgbClr val="000000"/>
                   </a:solidFill>
@@ -961,7 +962,7 @@
             </a:ln>
             <a:extLst>
               <a:ext uri="{91240B29-F687-4f45-9708-019B960494DF}">
-                <a14:hiddenLine xmlns:a14="http://schemas.microsoft.com/office/drawing/2010/main" xmlns="" w="9525">
+                <a14:hiddenLine xmlns="" xmlns:a14="http://schemas.microsoft.com/office/drawing/2010/main" w="9525">
                   <a:solidFill>
                     <a:srgbClr val="000000"/>
                   </a:solidFill>
@@ -1051,7 +1052,7 @@
             </a:ln>
             <a:extLst>
               <a:ext uri="{91240B29-F687-4f45-9708-019B960494DF}">
-                <a14:hiddenLine xmlns:a14="http://schemas.microsoft.com/office/drawing/2010/main" xmlns="" w="9525">
+                <a14:hiddenLine xmlns="" xmlns:a14="http://schemas.microsoft.com/office/drawing/2010/main" w="9525">
                   <a:solidFill>
                     <a:srgbClr val="000000"/>
                   </a:solidFill>
@@ -1113,7 +1114,7 @@
             </a:ln>
             <a:extLst>
               <a:ext uri="{91240B29-F687-4f45-9708-019B960494DF}">
-                <a14:hiddenLine xmlns:a14="http://schemas.microsoft.com/office/drawing/2010/main" xmlns="" w="9525">
+                <a14:hiddenLine xmlns="" xmlns:a14="http://schemas.microsoft.com/office/drawing/2010/main" w="9525">
                   <a:solidFill>
                     <a:srgbClr val="000000"/>
                   </a:solidFill>
@@ -1223,7 +1224,7 @@
             </a:ln>
             <a:extLst>
               <a:ext uri="{91240B29-F687-4f45-9708-019B960494DF}">
-                <a14:hiddenLine xmlns:a14="http://schemas.microsoft.com/office/drawing/2010/main" xmlns="" w="9525">
+                <a14:hiddenLine xmlns="" xmlns:a14="http://schemas.microsoft.com/office/drawing/2010/main" w="9525">
                   <a:solidFill>
                     <a:srgbClr val="000000"/>
                   </a:solidFill>
@@ -1285,7 +1286,7 @@
             </a:ln>
             <a:extLst>
               <a:ext uri="{91240B29-F687-4f45-9708-019B960494DF}">
-                <a14:hiddenLine xmlns:a14="http://schemas.microsoft.com/office/drawing/2010/main" xmlns="" w="9525">
+                <a14:hiddenLine xmlns="" xmlns:a14="http://schemas.microsoft.com/office/drawing/2010/main" w="9525">
                   <a:solidFill>
                     <a:srgbClr val="000000"/>
                   </a:solidFill>
@@ -1375,7 +1376,7 @@
             </a:ln>
             <a:extLst>
               <a:ext uri="{91240B29-F687-4f45-9708-019B960494DF}">
-                <a14:hiddenLine xmlns:a14="http://schemas.microsoft.com/office/drawing/2010/main" xmlns="" w="9525">
+                <a14:hiddenLine xmlns="" xmlns:a14="http://schemas.microsoft.com/office/drawing/2010/main" w="9525">
                   <a:solidFill>
                     <a:srgbClr val="000000"/>
                   </a:solidFill>
@@ -1465,7 +1466,7 @@
             </a:ln>
             <a:extLst>
               <a:ext uri="{91240B29-F687-4f45-9708-019B960494DF}">
-                <a14:hiddenLine xmlns:a14="http://schemas.microsoft.com/office/drawing/2010/main" xmlns="" w="9525">
+                <a14:hiddenLine xmlns="" xmlns:a14="http://schemas.microsoft.com/office/drawing/2010/main" w="9525">
                   <a:solidFill>
                     <a:srgbClr val="000000"/>
                   </a:solidFill>
@@ -1527,7 +1528,7 @@
             </a:ln>
             <a:extLst>
               <a:ext uri="{91240B29-F687-4f45-9708-019B960494DF}">
-                <a14:hiddenLine xmlns:a14="http://schemas.microsoft.com/office/drawing/2010/main" xmlns="" w="9525">
+                <a14:hiddenLine xmlns="" xmlns:a14="http://schemas.microsoft.com/office/drawing/2010/main" w="9525">
                   <a:solidFill>
                     <a:srgbClr val="000000"/>
                   </a:solidFill>
@@ -1617,7 +1618,7 @@
             </a:ln>
             <a:extLst>
               <a:ext uri="{91240B29-F687-4f45-9708-019B960494DF}">
-                <a14:hiddenLine xmlns:a14="http://schemas.microsoft.com/office/drawing/2010/main" xmlns="" w="9525">
+                <a14:hiddenLine xmlns="" xmlns:a14="http://schemas.microsoft.com/office/drawing/2010/main" w="9525">
                   <a:solidFill>
                     <a:srgbClr val="000000"/>
                   </a:solidFill>
@@ -1707,7 +1708,7 @@
             </a:ln>
             <a:extLst>
               <a:ext uri="{91240B29-F687-4f45-9708-019B960494DF}">
-                <a14:hiddenLine xmlns:a14="http://schemas.microsoft.com/office/drawing/2010/main" xmlns="" w="9525">
+                <a14:hiddenLine xmlns="" xmlns:a14="http://schemas.microsoft.com/office/drawing/2010/main" w="9525">
                   <a:solidFill>
                     <a:srgbClr val="000000"/>
                   </a:solidFill>
@@ -1763,7 +1764,7 @@
             </a:ln>
             <a:extLst>
               <a:ext uri="{91240B29-F687-4f45-9708-019B960494DF}">
-                <a14:hiddenLine xmlns:a14="http://schemas.microsoft.com/office/drawing/2010/main" xmlns="" w="9525">
+                <a14:hiddenLine xmlns="" xmlns:a14="http://schemas.microsoft.com/office/drawing/2010/main" w="9525">
                   <a:solidFill>
                     <a:srgbClr val="000000"/>
                   </a:solidFill>
@@ -1853,7 +1854,7 @@
             </a:ln>
             <a:extLst>
               <a:ext uri="{91240B29-F687-4f45-9708-019B960494DF}">
-                <a14:hiddenLine xmlns:a14="http://schemas.microsoft.com/office/drawing/2010/main" xmlns="" w="9525">
+                <a14:hiddenLine xmlns="" xmlns:a14="http://schemas.microsoft.com/office/drawing/2010/main" w="9525">
                   <a:solidFill>
                     <a:srgbClr val="000000"/>
                   </a:solidFill>
@@ -1909,7 +1910,7 @@
             </a:ln>
             <a:extLst>
               <a:ext uri="{91240B29-F687-4f45-9708-019B960494DF}">
-                <a14:hiddenLine xmlns:a14="http://schemas.microsoft.com/office/drawing/2010/main" xmlns="" w="9525">
+                <a14:hiddenLine xmlns="" xmlns:a14="http://schemas.microsoft.com/office/drawing/2010/main" w="9525">
                   <a:solidFill>
                     <a:srgbClr val="000000"/>
                   </a:solidFill>
@@ -1999,7 +2000,7 @@
             </a:ln>
             <a:extLst>
               <a:ext uri="{91240B29-F687-4f45-9708-019B960494DF}">
-                <a14:hiddenLine xmlns:a14="http://schemas.microsoft.com/office/drawing/2010/main" xmlns="" w="9525">
+                <a14:hiddenLine xmlns="" xmlns:a14="http://schemas.microsoft.com/office/drawing/2010/main" w="9525">
                   <a:solidFill>
                     <a:srgbClr val="000000"/>
                   </a:solidFill>
@@ -2067,7 +2068,7 @@
             </a:ln>
             <a:extLst>
               <a:ext uri="{91240B29-F687-4f45-9708-019B960494DF}">
-                <a14:hiddenLine xmlns:a14="http://schemas.microsoft.com/office/drawing/2010/main" xmlns="" w="9525">
+                <a14:hiddenLine xmlns="" xmlns:a14="http://schemas.microsoft.com/office/drawing/2010/main" w="9525">
                   <a:solidFill>
                     <a:srgbClr val="000000"/>
                   </a:solidFill>
@@ -2157,7 +2158,7 @@
             </a:ln>
             <a:extLst>
               <a:ext uri="{91240B29-F687-4f45-9708-019B960494DF}">
-                <a14:hiddenLine xmlns:a14="http://schemas.microsoft.com/office/drawing/2010/main" xmlns="" w="9525">
+                <a14:hiddenLine xmlns="" xmlns:a14="http://schemas.microsoft.com/office/drawing/2010/main" w="9525">
                   <a:solidFill>
                     <a:srgbClr val="000000"/>
                   </a:solidFill>
@@ -2225,7 +2226,7 @@
             </a:ln>
             <a:extLst>
               <a:ext uri="{91240B29-F687-4f45-9708-019B960494DF}">
-                <a14:hiddenLine xmlns:a14="http://schemas.microsoft.com/office/drawing/2010/main" xmlns="" w="9525">
+                <a14:hiddenLine xmlns="" xmlns:a14="http://schemas.microsoft.com/office/drawing/2010/main" w="9525">
                   <a:solidFill>
                     <a:srgbClr val="000000"/>
                   </a:solidFill>
@@ -2315,7 +2316,7 @@
             </a:ln>
             <a:extLst>
               <a:ext uri="{91240B29-F687-4f45-9708-019B960494DF}">
-                <a14:hiddenLine xmlns:a14="http://schemas.microsoft.com/office/drawing/2010/main" xmlns="" w="9525">
+                <a14:hiddenLine xmlns="" xmlns:a14="http://schemas.microsoft.com/office/drawing/2010/main" w="9525">
                   <a:solidFill>
                     <a:srgbClr val="000000"/>
                   </a:solidFill>
@@ -2349,7 +2350,7 @@
             </a:ln>
             <a:extLst>
               <a:ext uri="{91240B29-F687-4f45-9708-019B960494DF}">
-                <a14:hiddenLine xmlns:a14="http://schemas.microsoft.com/office/drawing/2010/main" xmlns="" w="9525">
+                <a14:hiddenLine xmlns="" xmlns:a14="http://schemas.microsoft.com/office/drawing/2010/main" w="9525">
                   <a:solidFill>
                     <a:srgbClr val="000000"/>
                   </a:solidFill>
@@ -2439,7 +2440,7 @@
             </a:ln>
             <a:extLst>
               <a:ext uri="{91240B29-F687-4f45-9708-019B960494DF}">
-                <a14:hiddenLine xmlns:a14="http://schemas.microsoft.com/office/drawing/2010/main" xmlns="" w="9525">
+                <a14:hiddenLine xmlns="" xmlns:a14="http://schemas.microsoft.com/office/drawing/2010/main" w="9525">
                   <a:solidFill>
                     <a:srgbClr val="000000"/>
                   </a:solidFill>
@@ -2501,7 +2502,7 @@
             </a:ln>
             <a:extLst>
               <a:ext uri="{91240B29-F687-4f45-9708-019B960494DF}">
-                <a14:hiddenLine xmlns:a14="http://schemas.microsoft.com/office/drawing/2010/main" xmlns="" w="9525">
+                <a14:hiddenLine xmlns="" xmlns:a14="http://schemas.microsoft.com/office/drawing/2010/main" w="9525">
                   <a:solidFill>
                     <a:srgbClr val="000000"/>
                   </a:solidFill>
@@ -2563,7 +2564,7 @@
             </a:ln>
             <a:extLst>
               <a:ext uri="{91240B29-F687-4f45-9708-019B960494DF}">
-                <a14:hiddenLine xmlns:a14="http://schemas.microsoft.com/office/drawing/2010/main" xmlns="" w="9525">
+                <a14:hiddenLine xmlns="" xmlns:a14="http://schemas.microsoft.com/office/drawing/2010/main" w="9525">
                   <a:solidFill>
                     <a:srgbClr val="000000"/>
                   </a:solidFill>
@@ -2653,7 +2654,7 @@
             </a:ln>
             <a:extLst>
               <a:ext uri="{91240B29-F687-4f45-9708-019B960494DF}">
-                <a14:hiddenLine xmlns:a14="http://schemas.microsoft.com/office/drawing/2010/main" xmlns="" w="9525">
+                <a14:hiddenLine xmlns="" xmlns:a14="http://schemas.microsoft.com/office/drawing/2010/main" w="9525">
                   <a:solidFill>
                     <a:srgbClr val="000000"/>
                   </a:solidFill>
@@ -2721,7 +2722,7 @@
             </a:ln>
             <a:extLst>
               <a:ext uri="{91240B29-F687-4f45-9708-019B960494DF}">
-                <a14:hiddenLine xmlns:a14="http://schemas.microsoft.com/office/drawing/2010/main" xmlns="" w="9525">
+                <a14:hiddenLine xmlns="" xmlns:a14="http://schemas.microsoft.com/office/drawing/2010/main" w="9525">
                   <a:solidFill>
                     <a:srgbClr val="000000"/>
                   </a:solidFill>
@@ -2783,7 +2784,7 @@
             </a:ln>
             <a:extLst>
               <a:ext uri="{91240B29-F687-4f45-9708-019B960494DF}">
-                <a14:hiddenLine xmlns:a14="http://schemas.microsoft.com/office/drawing/2010/main" xmlns="" w="9525">
+                <a14:hiddenLine xmlns="" xmlns:a14="http://schemas.microsoft.com/office/drawing/2010/main" w="9525">
                   <a:solidFill>
                     <a:srgbClr val="000000"/>
                   </a:solidFill>
@@ -2873,7 +2874,7 @@
             </a:ln>
             <a:extLst>
               <a:ext uri="{91240B29-F687-4f45-9708-019B960494DF}">
-                <a14:hiddenLine xmlns:a14="http://schemas.microsoft.com/office/drawing/2010/main" xmlns="" w="9525">
+                <a14:hiddenLine xmlns="" xmlns:a14="http://schemas.microsoft.com/office/drawing/2010/main" w="9525">
                   <a:solidFill>
                     <a:srgbClr val="000000"/>
                   </a:solidFill>
@@ -2935,7 +2936,7 @@
             </a:ln>
             <a:extLst>
               <a:ext uri="{91240B29-F687-4f45-9708-019B960494DF}">
-                <a14:hiddenLine xmlns:a14="http://schemas.microsoft.com/office/drawing/2010/main" xmlns="" w="9525">
+                <a14:hiddenLine xmlns="" xmlns:a14="http://schemas.microsoft.com/office/drawing/2010/main" w="9525">
                   <a:solidFill>
                     <a:srgbClr val="000000"/>
                   </a:solidFill>
@@ -3025,7 +3026,7 @@
             </a:ln>
             <a:extLst>
               <a:ext uri="{91240B29-F687-4f45-9708-019B960494DF}">
-                <a14:hiddenLine xmlns:a14="http://schemas.microsoft.com/office/drawing/2010/main" xmlns="" w="9525">
+                <a14:hiddenLine xmlns="" xmlns:a14="http://schemas.microsoft.com/office/drawing/2010/main" w="9525">
                   <a:solidFill>
                     <a:srgbClr val="000000"/>
                   </a:solidFill>
@@ -3087,7 +3088,7 @@
             </a:ln>
             <a:extLst>
               <a:ext uri="{91240B29-F687-4f45-9708-019B960494DF}">
-                <a14:hiddenLine xmlns:a14="http://schemas.microsoft.com/office/drawing/2010/main" xmlns="" w="9525">
+                <a14:hiddenLine xmlns="" xmlns:a14="http://schemas.microsoft.com/office/drawing/2010/main" w="9525">
                   <a:solidFill>
                     <a:srgbClr val="000000"/>
                   </a:solidFill>
@@ -3177,7 +3178,7 @@
             </a:ln>
             <a:extLst>
               <a:ext uri="{91240B29-F687-4f45-9708-019B960494DF}">
-                <a14:hiddenLine xmlns:a14="http://schemas.microsoft.com/office/drawing/2010/main" xmlns="" w="9525">
+                <a14:hiddenLine xmlns="" xmlns:a14="http://schemas.microsoft.com/office/drawing/2010/main" w="9525">
                   <a:solidFill>
                     <a:srgbClr val="000000"/>
                   </a:solidFill>
@@ -3211,7 +3212,7 @@
             </a:ln>
             <a:extLst>
               <a:ext uri="{91240B29-F687-4f45-9708-019B960494DF}">
-                <a14:hiddenLine xmlns:a14="http://schemas.microsoft.com/office/drawing/2010/main" xmlns="" w="9525">
+                <a14:hiddenLine xmlns="" xmlns:a14="http://schemas.microsoft.com/office/drawing/2010/main" w="9525">
                   <a:solidFill>
                     <a:srgbClr val="000000"/>
                   </a:solidFill>
@@ -3276,7 +3277,7 @@
             </a:ln>
             <a:extLst>
               <a:ext uri="{91240B29-F687-4f45-9708-019B960494DF}">
-                <a14:hiddenLine xmlns:a14="http://schemas.microsoft.com/office/drawing/2010/main" xmlns="" w="9525">
+                <a14:hiddenLine xmlns="" xmlns:a14="http://schemas.microsoft.com/office/drawing/2010/main" w="9525">
                   <a:solidFill>
                     <a:srgbClr val="000000"/>
                   </a:solidFill>
@@ -3366,7 +3367,7 @@
             </a:ln>
             <a:extLst>
               <a:ext uri="{91240B29-F687-4f45-9708-019B960494DF}">
-                <a14:hiddenLine xmlns:a14="http://schemas.microsoft.com/office/drawing/2010/main" xmlns="" w="9525">
+                <a14:hiddenLine xmlns="" xmlns:a14="http://schemas.microsoft.com/office/drawing/2010/main" w="9525">
                   <a:solidFill>
                     <a:srgbClr val="000000"/>
                   </a:solidFill>
@@ -3428,7 +3429,7 @@
             </a:ln>
             <a:extLst>
               <a:ext uri="{91240B29-F687-4f45-9708-019B960494DF}">
-                <a14:hiddenLine xmlns:a14="http://schemas.microsoft.com/office/drawing/2010/main" xmlns="" w="9525">
+                <a14:hiddenLine xmlns="" xmlns:a14="http://schemas.microsoft.com/office/drawing/2010/main" w="9525">
                   <a:solidFill>
                     <a:srgbClr val="000000"/>
                   </a:solidFill>
@@ -3518,7 +3519,7 @@
             </a:ln>
             <a:extLst>
               <a:ext uri="{91240B29-F687-4f45-9708-019B960494DF}">
-                <a14:hiddenLine xmlns:a14="http://schemas.microsoft.com/office/drawing/2010/main" xmlns="" w="9525">
+                <a14:hiddenLine xmlns="" xmlns:a14="http://schemas.microsoft.com/office/drawing/2010/main" w="9525">
                   <a:solidFill>
                     <a:srgbClr val="000000"/>
                   </a:solidFill>
@@ -3608,7 +3609,7 @@
             </a:ln>
             <a:extLst>
               <a:ext uri="{91240B29-F687-4f45-9708-019B960494DF}">
-                <a14:hiddenLine xmlns:a14="http://schemas.microsoft.com/office/drawing/2010/main" xmlns="" w="9525">
+                <a14:hiddenLine xmlns="" xmlns:a14="http://schemas.microsoft.com/office/drawing/2010/main" w="9525">
                   <a:solidFill>
                     <a:srgbClr val="000000"/>
                   </a:solidFill>
@@ -3673,7 +3674,7 @@
             </a:ln>
             <a:extLst>
               <a:ext uri="{91240B29-F687-4f45-9708-019B960494DF}">
-                <a14:hiddenLine xmlns:a14="http://schemas.microsoft.com/office/drawing/2010/main" xmlns="" w="9525">
+                <a14:hiddenLine xmlns="" xmlns:a14="http://schemas.microsoft.com/office/drawing/2010/main" w="9525">
                   <a:solidFill>
                     <a:srgbClr val="000000"/>
                   </a:solidFill>
@@ -3735,7 +3736,7 @@
             </a:ln>
             <a:extLst>
               <a:ext uri="{91240B29-F687-4f45-9708-019B960494DF}">
-                <a14:hiddenLine xmlns:a14="http://schemas.microsoft.com/office/drawing/2010/main" xmlns="" w="9525">
+                <a14:hiddenLine xmlns="" xmlns:a14="http://schemas.microsoft.com/office/drawing/2010/main" w="9525">
                   <a:solidFill>
                     <a:srgbClr val="000000"/>
                   </a:solidFill>
@@ -3825,7 +3826,7 @@
             </a:ln>
             <a:extLst>
               <a:ext uri="{91240B29-F687-4f45-9708-019B960494DF}">
-                <a14:hiddenLine xmlns:a14="http://schemas.microsoft.com/office/drawing/2010/main" xmlns="" w="9525">
+                <a14:hiddenLine xmlns="" xmlns:a14="http://schemas.microsoft.com/office/drawing/2010/main" w="9525">
                   <a:solidFill>
                     <a:srgbClr val="000000"/>
                   </a:solidFill>
@@ -3915,7 +3916,7 @@
             </a:ln>
             <a:extLst>
               <a:ext uri="{91240B29-F687-4f45-9708-019B960494DF}">
-                <a14:hiddenLine xmlns:a14="http://schemas.microsoft.com/office/drawing/2010/main" xmlns="" w="9525">
+                <a14:hiddenLine xmlns="" xmlns:a14="http://schemas.microsoft.com/office/drawing/2010/main" w="9525">
                   <a:solidFill>
                     <a:srgbClr val="000000"/>
                   </a:solidFill>
@@ -3977,7 +3978,7 @@
             </a:ln>
             <a:extLst>
               <a:ext uri="{91240B29-F687-4f45-9708-019B960494DF}">
-                <a14:hiddenLine xmlns:a14="http://schemas.microsoft.com/office/drawing/2010/main" xmlns="" w="9525">
+                <a14:hiddenLine xmlns="" xmlns:a14="http://schemas.microsoft.com/office/drawing/2010/main" w="9525">
                   <a:solidFill>
                     <a:srgbClr val="000000"/>
                   </a:solidFill>
@@ -4097,7 +4098,7 @@
             </a:ln>
             <a:extLst>
               <a:ext uri="{91240B29-F687-4f45-9708-019B960494DF}">
-                <a14:hiddenLine xmlns:a14="http://schemas.microsoft.com/office/drawing/2010/main" xmlns="" w="9525">
+                <a14:hiddenLine xmlns="" xmlns:a14="http://schemas.microsoft.com/office/drawing/2010/main" w="9525">
                   <a:solidFill>
                     <a:srgbClr val="000000"/>
                   </a:solidFill>
@@ -4165,7 +4166,7 @@
             </a:ln>
             <a:extLst>
               <a:ext uri="{91240B29-F687-4f45-9708-019B960494DF}">
-                <a14:hiddenLine xmlns:a14="http://schemas.microsoft.com/office/drawing/2010/main" xmlns="" w="9525">
+                <a14:hiddenLine xmlns="" xmlns:a14="http://schemas.microsoft.com/office/drawing/2010/main" w="9525">
                   <a:solidFill>
                     <a:srgbClr val="000000"/>
                   </a:solidFill>
@@ -4255,7 +4256,7 @@
             </a:ln>
             <a:extLst>
               <a:ext uri="{91240B29-F687-4f45-9708-019B960494DF}">
-                <a14:hiddenLine xmlns:a14="http://schemas.microsoft.com/office/drawing/2010/main" xmlns="" w="9525">
+                <a14:hiddenLine xmlns="" xmlns:a14="http://schemas.microsoft.com/office/drawing/2010/main" w="9525">
                   <a:solidFill>
                     <a:srgbClr val="000000"/>
                   </a:solidFill>
@@ -8977,7 +8978,7 @@
           <a:noFill/>
           <a:extLst>
             <a:ext uri="{909E8E84-426E-40dd-AFC4-6F175D3DCCD1}">
-              <a14:hiddenFill xmlns:a14="http://schemas.microsoft.com/office/drawing/2010/main" xmlns="">
+              <a14:hiddenFill xmlns="" xmlns:a14="http://schemas.microsoft.com/office/drawing/2010/main">
                 <a:solidFill>
                   <a:srgbClr val="FFFFFF"/>
                 </a:solidFill>
@@ -9051,7 +9052,7 @@
               </a:ln>
               <a:extLst>
                 <a:ext uri="{91240B29-F687-4f45-9708-019B960494DF}">
-                  <a14:hiddenLine xmlns:a14="http://schemas.microsoft.com/office/drawing/2010/main" xmlns="" w="9525">
+                  <a14:hiddenLine xmlns="" xmlns:a14="http://schemas.microsoft.com/office/drawing/2010/main" w="9525">
                     <a:solidFill>
                       <a:srgbClr val="000000"/>
                     </a:solidFill>
@@ -9141,7 +9142,7 @@
               </a:ln>
               <a:extLst>
                 <a:ext uri="{91240B29-F687-4f45-9708-019B960494DF}">
-                  <a14:hiddenLine xmlns:a14="http://schemas.microsoft.com/office/drawing/2010/main" xmlns="" w="9525">
+                  <a14:hiddenLine xmlns="" xmlns:a14="http://schemas.microsoft.com/office/drawing/2010/main" w="9525">
                     <a:solidFill>
                       <a:srgbClr val="000000"/>
                     </a:solidFill>
@@ -9231,7 +9232,7 @@
               </a:ln>
               <a:extLst>
                 <a:ext uri="{91240B29-F687-4f45-9708-019B960494DF}">
-                  <a14:hiddenLine xmlns:a14="http://schemas.microsoft.com/office/drawing/2010/main" xmlns="" w="9525">
+                  <a14:hiddenLine xmlns="" xmlns:a14="http://schemas.microsoft.com/office/drawing/2010/main" w="9525">
                     <a:solidFill>
                       <a:srgbClr val="000000"/>
                     </a:solidFill>
@@ -9293,7 +9294,7 @@
               </a:ln>
               <a:extLst>
                 <a:ext uri="{91240B29-F687-4f45-9708-019B960494DF}">
-                  <a14:hiddenLine xmlns:a14="http://schemas.microsoft.com/office/drawing/2010/main" xmlns="" w="9525">
+                  <a14:hiddenLine xmlns="" xmlns:a14="http://schemas.microsoft.com/office/drawing/2010/main" w="9525">
                     <a:solidFill>
                       <a:srgbClr val="000000"/>
                     </a:solidFill>
@@ -9383,7 +9384,7 @@
               </a:ln>
               <a:extLst>
                 <a:ext uri="{91240B29-F687-4f45-9708-019B960494DF}">
-                  <a14:hiddenLine xmlns:a14="http://schemas.microsoft.com/office/drawing/2010/main" xmlns="" w="9525">
+                  <a14:hiddenLine xmlns="" xmlns:a14="http://schemas.microsoft.com/office/drawing/2010/main" w="9525">
                     <a:solidFill>
                       <a:srgbClr val="000000"/>
                     </a:solidFill>
@@ -9445,7 +9446,7 @@
               </a:ln>
               <a:extLst>
                 <a:ext uri="{91240B29-F687-4f45-9708-019B960494DF}">
-                  <a14:hiddenLine xmlns:a14="http://schemas.microsoft.com/office/drawing/2010/main" xmlns="" w="9525">
+                  <a14:hiddenLine xmlns="" xmlns:a14="http://schemas.microsoft.com/office/drawing/2010/main" w="9525">
                     <a:solidFill>
                       <a:srgbClr val="000000"/>
                     </a:solidFill>
@@ -9507,7 +9508,7 @@
               </a:ln>
               <a:extLst>
                 <a:ext uri="{91240B29-F687-4f45-9708-019B960494DF}">
-                  <a14:hiddenLine xmlns:a14="http://schemas.microsoft.com/office/drawing/2010/main" xmlns="" w="9525">
+                  <a14:hiddenLine xmlns="" xmlns:a14="http://schemas.microsoft.com/office/drawing/2010/main" w="9525">
                     <a:solidFill>
                       <a:srgbClr val="000000"/>
                     </a:solidFill>
@@ -9597,7 +9598,7 @@
               </a:ln>
               <a:extLst>
                 <a:ext uri="{91240B29-F687-4f45-9708-019B960494DF}">
-                  <a14:hiddenLine xmlns:a14="http://schemas.microsoft.com/office/drawing/2010/main" xmlns="" w="9525">
+                  <a14:hiddenLine xmlns="" xmlns:a14="http://schemas.microsoft.com/office/drawing/2010/main" w="9525">
                     <a:solidFill>
                       <a:srgbClr val="000000"/>
                     </a:solidFill>
@@ -9687,7 +9688,7 @@
               </a:ln>
               <a:extLst>
                 <a:ext uri="{91240B29-F687-4f45-9708-019B960494DF}">
-                  <a14:hiddenLine xmlns:a14="http://schemas.microsoft.com/office/drawing/2010/main" xmlns="" w="9525">
+                  <a14:hiddenLine xmlns="" xmlns:a14="http://schemas.microsoft.com/office/drawing/2010/main" w="9525">
                     <a:solidFill>
                       <a:srgbClr val="000000"/>
                     </a:solidFill>
@@ -9749,7 +9750,7 @@
               </a:ln>
               <a:extLst>
                 <a:ext uri="{91240B29-F687-4f45-9708-019B960494DF}">
-                  <a14:hiddenLine xmlns:a14="http://schemas.microsoft.com/office/drawing/2010/main" xmlns="" w="9525">
+                  <a14:hiddenLine xmlns="" xmlns:a14="http://schemas.microsoft.com/office/drawing/2010/main" w="9525">
                     <a:solidFill>
                       <a:srgbClr val="000000"/>
                     </a:solidFill>
@@ -9859,7 +9860,7 @@
               </a:ln>
               <a:extLst>
                 <a:ext uri="{91240B29-F687-4f45-9708-019B960494DF}">
-                  <a14:hiddenLine xmlns:a14="http://schemas.microsoft.com/office/drawing/2010/main" xmlns="" w="9525">
+                  <a14:hiddenLine xmlns="" xmlns:a14="http://schemas.microsoft.com/office/drawing/2010/main" w="9525">
                     <a:solidFill>
                       <a:srgbClr val="000000"/>
                     </a:solidFill>
@@ -9943,7 +9944,7 @@
               </a:ln>
               <a:extLst>
                 <a:ext uri="{91240B29-F687-4f45-9708-019B960494DF}">
-                  <a14:hiddenLine xmlns:a14="http://schemas.microsoft.com/office/drawing/2010/main" xmlns="" w="9525">
+                  <a14:hiddenLine xmlns="" xmlns:a14="http://schemas.microsoft.com/office/drawing/2010/main" w="9525">
                     <a:solidFill>
                       <a:srgbClr val="000000"/>
                     </a:solidFill>
@@ -10005,7 +10006,7 @@
               </a:ln>
               <a:extLst>
                 <a:ext uri="{91240B29-F687-4f45-9708-019B960494DF}">
-                  <a14:hiddenLine xmlns:a14="http://schemas.microsoft.com/office/drawing/2010/main" xmlns="" w="9525">
+                  <a14:hiddenLine xmlns="" xmlns:a14="http://schemas.microsoft.com/office/drawing/2010/main" w="9525">
                     <a:solidFill>
                       <a:srgbClr val="000000"/>
                     </a:solidFill>
@@ -10067,7 +10068,7 @@
               </a:ln>
               <a:extLst>
                 <a:ext uri="{91240B29-F687-4f45-9708-019B960494DF}">
-                  <a14:hiddenLine xmlns:a14="http://schemas.microsoft.com/office/drawing/2010/main" xmlns="" w="9525">
+                  <a14:hiddenLine xmlns="" xmlns:a14="http://schemas.microsoft.com/office/drawing/2010/main" w="9525">
                     <a:solidFill>
                       <a:srgbClr val="000000"/>
                     </a:solidFill>
@@ -10157,7 +10158,7 @@
               </a:ln>
               <a:extLst>
                 <a:ext uri="{91240B29-F687-4f45-9708-019B960494DF}">
-                  <a14:hiddenLine xmlns:a14="http://schemas.microsoft.com/office/drawing/2010/main" xmlns="" w="9525">
+                  <a14:hiddenLine xmlns="" xmlns:a14="http://schemas.microsoft.com/office/drawing/2010/main" w="9525">
                     <a:solidFill>
                       <a:srgbClr val="000000"/>
                     </a:solidFill>
@@ -10191,7 +10192,7 @@
               </a:ln>
               <a:extLst>
                 <a:ext uri="{91240B29-F687-4f45-9708-019B960494DF}">
-                  <a14:hiddenLine xmlns:a14="http://schemas.microsoft.com/office/drawing/2010/main" xmlns="" w="9525">
+                  <a14:hiddenLine xmlns="" xmlns:a14="http://schemas.microsoft.com/office/drawing/2010/main" w="9525">
                     <a:solidFill>
                       <a:srgbClr val="000000"/>
                     </a:solidFill>
@@ -10256,7 +10257,7 @@
               </a:ln>
               <a:extLst>
                 <a:ext uri="{91240B29-F687-4f45-9708-019B960494DF}">
-                  <a14:hiddenLine xmlns:a14="http://schemas.microsoft.com/office/drawing/2010/main" xmlns="" w="9525">
+                  <a14:hiddenLine xmlns="" xmlns:a14="http://schemas.microsoft.com/office/drawing/2010/main" w="9525">
                     <a:solidFill>
                       <a:srgbClr val="000000"/>
                     </a:solidFill>
@@ -10346,7 +10347,7 @@
               </a:ln>
               <a:extLst>
                 <a:ext uri="{91240B29-F687-4f45-9708-019B960494DF}">
-                  <a14:hiddenLine xmlns:a14="http://schemas.microsoft.com/office/drawing/2010/main" xmlns="" w="9525">
+                  <a14:hiddenLine xmlns="" xmlns:a14="http://schemas.microsoft.com/office/drawing/2010/main" w="9525">
                     <a:solidFill>
                       <a:srgbClr val="000000"/>
                     </a:solidFill>
@@ -10408,7 +10409,7 @@
               </a:ln>
               <a:extLst>
                 <a:ext uri="{91240B29-F687-4f45-9708-019B960494DF}">
-                  <a14:hiddenLine xmlns:a14="http://schemas.microsoft.com/office/drawing/2010/main" xmlns="" w="9525">
+                  <a14:hiddenLine xmlns="" xmlns:a14="http://schemas.microsoft.com/office/drawing/2010/main" w="9525">
                     <a:solidFill>
                       <a:srgbClr val="000000"/>
                     </a:solidFill>
@@ -10498,7 +10499,7 @@
               </a:ln>
               <a:extLst>
                 <a:ext uri="{91240B29-F687-4f45-9708-019B960494DF}">
-                  <a14:hiddenLine xmlns:a14="http://schemas.microsoft.com/office/drawing/2010/main" xmlns="" w="9525">
+                  <a14:hiddenLine xmlns="" xmlns:a14="http://schemas.microsoft.com/office/drawing/2010/main" w="9525">
                     <a:solidFill>
                       <a:srgbClr val="000000"/>
                     </a:solidFill>
@@ -10563,7 +10564,7 @@
               </a:ln>
               <a:extLst>
                 <a:ext uri="{91240B29-F687-4f45-9708-019B960494DF}">
-                  <a14:hiddenLine xmlns:a14="http://schemas.microsoft.com/office/drawing/2010/main" xmlns="" w="9525">
+                  <a14:hiddenLine xmlns="" xmlns:a14="http://schemas.microsoft.com/office/drawing/2010/main" w="9525">
                     <a:solidFill>
                       <a:srgbClr val="000000"/>
                     </a:solidFill>
@@ -10625,7 +10626,7 @@
               </a:ln>
               <a:extLst>
                 <a:ext uri="{91240B29-F687-4f45-9708-019B960494DF}">
-                  <a14:hiddenLine xmlns:a14="http://schemas.microsoft.com/office/drawing/2010/main" xmlns="" w="9525">
+                  <a14:hiddenLine xmlns="" xmlns:a14="http://schemas.microsoft.com/office/drawing/2010/main" w="9525">
                     <a:solidFill>
                       <a:srgbClr val="000000"/>
                     </a:solidFill>
@@ -10715,7 +10716,7 @@
               </a:ln>
               <a:extLst>
                 <a:ext uri="{91240B29-F687-4f45-9708-019B960494DF}">
-                  <a14:hiddenLine xmlns:a14="http://schemas.microsoft.com/office/drawing/2010/main" xmlns="" w="9525">
+                  <a14:hiddenLine xmlns="" xmlns:a14="http://schemas.microsoft.com/office/drawing/2010/main" w="9525">
                     <a:solidFill>
                       <a:srgbClr val="000000"/>
                     </a:solidFill>
@@ -10805,7 +10806,7 @@
               </a:ln>
               <a:extLst>
                 <a:ext uri="{91240B29-F687-4f45-9708-019B960494DF}">
-                  <a14:hiddenLine xmlns:a14="http://schemas.microsoft.com/office/drawing/2010/main" xmlns="" w="9525">
+                  <a14:hiddenLine xmlns="" xmlns:a14="http://schemas.microsoft.com/office/drawing/2010/main" w="9525">
                     <a:solidFill>
                       <a:srgbClr val="000000"/>
                     </a:solidFill>
@@ -10870,7 +10871,7 @@
               </a:ln>
               <a:extLst>
                 <a:ext uri="{91240B29-F687-4f45-9708-019B960494DF}">
-                  <a14:hiddenLine xmlns:a14="http://schemas.microsoft.com/office/drawing/2010/main" xmlns="" w="9525">
+                  <a14:hiddenLine xmlns="" xmlns:a14="http://schemas.microsoft.com/office/drawing/2010/main" w="9525">
                     <a:solidFill>
                       <a:srgbClr val="000000"/>
                     </a:solidFill>
@@ -10990,7 +10991,7 @@
               </a:ln>
               <a:extLst>
                 <a:ext uri="{91240B29-F687-4f45-9708-019B960494DF}">
-                  <a14:hiddenLine xmlns:a14="http://schemas.microsoft.com/office/drawing/2010/main" xmlns="" w="9525">
+                  <a14:hiddenLine xmlns="" xmlns:a14="http://schemas.microsoft.com/office/drawing/2010/main" w="9525">
                     <a:solidFill>
                       <a:srgbClr val="000000"/>
                     </a:solidFill>
@@ -11088,7 +11089,7 @@
               </a:ln>
               <a:extLst>
                 <a:ext uri="{91240B29-F687-4f45-9708-019B960494DF}">
-                  <a14:hiddenLine xmlns:a14="http://schemas.microsoft.com/office/drawing/2010/main" xmlns="" w="9525">
+                  <a14:hiddenLine xmlns="" xmlns:a14="http://schemas.microsoft.com/office/drawing/2010/main" w="9525">
                     <a:solidFill>
                       <a:srgbClr val="000000"/>
                     </a:solidFill>
@@ -11203,7 +11204,7 @@
               </a:ln>
               <a:extLst>
                 <a:ext uri="{91240B29-F687-4f45-9708-019B960494DF}">
-                  <a14:hiddenLine xmlns:a14="http://schemas.microsoft.com/office/drawing/2010/main" xmlns="" w="9525">
+                  <a14:hiddenLine xmlns="" xmlns:a14="http://schemas.microsoft.com/office/drawing/2010/main" w="9525">
                     <a:solidFill>
                       <a:srgbClr val="000000"/>
                     </a:solidFill>
@@ -11293,7 +11294,7 @@
               </a:ln>
               <a:extLst>
                 <a:ext uri="{91240B29-F687-4f45-9708-019B960494DF}">
-                  <a14:hiddenLine xmlns:a14="http://schemas.microsoft.com/office/drawing/2010/main" xmlns="" w="9525">
+                  <a14:hiddenLine xmlns="" xmlns:a14="http://schemas.microsoft.com/office/drawing/2010/main" w="9525">
                     <a:solidFill>
                       <a:srgbClr val="000000"/>
                     </a:solidFill>
@@ -11358,7 +11359,7 @@
               </a:ln>
               <a:extLst>
                 <a:ext uri="{91240B29-F687-4f45-9708-019B960494DF}">
-                  <a14:hiddenLine xmlns:a14="http://schemas.microsoft.com/office/drawing/2010/main" xmlns="" w="9525">
+                  <a14:hiddenLine xmlns="" xmlns:a14="http://schemas.microsoft.com/office/drawing/2010/main" w="9525">
                     <a:solidFill>
                       <a:srgbClr val="000000"/>
                     </a:solidFill>
@@ -11448,7 +11449,7 @@
               </a:ln>
               <a:extLst>
                 <a:ext uri="{91240B29-F687-4f45-9708-019B960494DF}">
-                  <a14:hiddenLine xmlns:a14="http://schemas.microsoft.com/office/drawing/2010/main" xmlns="" w="9525">
+                  <a14:hiddenLine xmlns="" xmlns:a14="http://schemas.microsoft.com/office/drawing/2010/main" w="9525">
                     <a:solidFill>
                       <a:srgbClr val="000000"/>
                     </a:solidFill>
@@ -11516,7 +11517,7 @@
               </a:ln>
               <a:extLst>
                 <a:ext uri="{91240B29-F687-4f45-9708-019B960494DF}">
-                  <a14:hiddenLine xmlns:a14="http://schemas.microsoft.com/office/drawing/2010/main" xmlns="" w="9525">
+                  <a14:hiddenLine xmlns="" xmlns:a14="http://schemas.microsoft.com/office/drawing/2010/main" w="9525">
                     <a:solidFill>
                       <a:srgbClr val="000000"/>
                     </a:solidFill>
@@ -11606,7 +11607,7 @@
               </a:ln>
               <a:extLst>
                 <a:ext uri="{91240B29-F687-4f45-9708-019B960494DF}">
-                  <a14:hiddenLine xmlns:a14="http://schemas.microsoft.com/office/drawing/2010/main" xmlns="" w="9525">
+                  <a14:hiddenLine xmlns="" xmlns:a14="http://schemas.microsoft.com/office/drawing/2010/main" w="9525">
                     <a:solidFill>
                       <a:srgbClr val="000000"/>
                     </a:solidFill>
@@ -11674,7 +11675,7 @@
               </a:ln>
               <a:extLst>
                 <a:ext uri="{91240B29-F687-4f45-9708-019B960494DF}">
-                  <a14:hiddenLine xmlns:a14="http://schemas.microsoft.com/office/drawing/2010/main" xmlns="" w="9525">
+                  <a14:hiddenLine xmlns="" xmlns:a14="http://schemas.microsoft.com/office/drawing/2010/main" w="9525">
                     <a:solidFill>
                       <a:srgbClr val="000000"/>
                     </a:solidFill>
@@ -11764,7 +11765,7 @@
               </a:ln>
               <a:extLst>
                 <a:ext uri="{91240B29-F687-4f45-9708-019B960494DF}">
-                  <a14:hiddenLine xmlns:a14="http://schemas.microsoft.com/office/drawing/2010/main" xmlns="" w="9525">
+                  <a14:hiddenLine xmlns="" xmlns:a14="http://schemas.microsoft.com/office/drawing/2010/main" w="9525">
                     <a:solidFill>
                       <a:srgbClr val="000000"/>
                     </a:solidFill>
@@ -11798,7 +11799,7 @@
               </a:ln>
               <a:extLst>
                 <a:ext uri="{91240B29-F687-4f45-9708-019B960494DF}">
-                  <a14:hiddenLine xmlns:a14="http://schemas.microsoft.com/office/drawing/2010/main" xmlns="" w="9525">
+                  <a14:hiddenLine xmlns="" xmlns:a14="http://schemas.microsoft.com/office/drawing/2010/main" w="9525">
                     <a:solidFill>
                       <a:srgbClr val="000000"/>
                     </a:solidFill>
@@ -12864,7 +12865,7 @@
           <a:p>
             <a:r>
               <a:rPr lang="en-US" dirty="0"/>
-              <a:t>How the code works</a:t>
+              <a:t>Streaming vs batching vs history</a:t>
             </a:r>
           </a:p>
         </p:txBody>
@@ -12885,19 +12886,88 @@
             <p:ph idx="1"/>
           </p:nvPr>
         </p:nvSpPr>
-        <p:spPr/>
+        <p:spPr>
+          <a:xfrm>
+            <a:off x="1141412" y="1959429"/>
+            <a:ext cx="9905999" cy="3831772"/>
+          </a:xfrm>
+        </p:spPr>
         <p:txBody>
-          <a:bodyPr/>
+          <a:bodyPr>
+            <a:normAutofit fontScale="92500" lnSpcReduction="20000"/>
+          </a:bodyPr>
           <a:lstStyle/>
           <a:p>
+            <a:r>
+              <a:rPr lang="en-US" dirty="0"/>
+              <a:t>Streaming allows for the intake of twitter data in real time</a:t>
+            </a:r>
+          </a:p>
+          <a:p>
+            <a:pPr lvl="1"/>
+            <a:r>
+              <a:rPr lang="en-US" dirty="0"/>
+              <a:t>This allows for broader searches where a user can take in data by text, hashtags, </a:t>
+            </a:r>
+            <a:r>
+              <a:rPr lang="en-US" dirty="0" err="1"/>
+              <a:t>etc</a:t>
+            </a:r>
             <a:endParaRPr lang="en-US" dirty="0"/>
+          </a:p>
+          <a:p>
+            <a:pPr lvl="1"/>
+            <a:r>
+              <a:rPr lang="en-US" dirty="0"/>
+              <a:t>Allows the ability to quickly get a pulse for activity</a:t>
+            </a:r>
+          </a:p>
+          <a:p>
+            <a:r>
+              <a:rPr lang="en-US" dirty="0"/>
+              <a:t>Batching twitter data often involves pulling historical data from defined users</a:t>
+            </a:r>
+          </a:p>
+          <a:p>
+            <a:pPr lvl="1"/>
+            <a:r>
+              <a:rPr lang="en-US" dirty="0"/>
+              <a:t>Often this is referring to enterprise grade licensing, but can also refer to user data pulled in a batch.</a:t>
+            </a:r>
+          </a:p>
+          <a:p>
+            <a:pPr lvl="1"/>
+            <a:r>
+              <a:rPr lang="en-US" dirty="0"/>
+              <a:t>This somewhat limits the scope since getting historical hashtag data is nearly impossible</a:t>
+            </a:r>
+          </a:p>
+          <a:p>
+            <a:r>
+              <a:rPr lang="en-US" dirty="0"/>
+              <a:t>Enterprise grade batch/History data</a:t>
+            </a:r>
+          </a:p>
+          <a:p>
+            <a:pPr lvl="1"/>
+            <a:r>
+              <a:rPr lang="en-US" dirty="0"/>
+              <a:t>Can be purchased through an enterprise license, not available freely without restrictions</a:t>
+            </a:r>
+          </a:p>
+          <a:p>
+            <a:pPr lvl="1"/>
+            <a:r>
+              <a:rPr lang="en-US" dirty="0"/>
+              <a:t>Will not be in scope as it is only available on contractual basis for a cost.</a:t>
+            </a:r>
           </a:p>
         </p:txBody>
       </p:sp>
     </p:spTree>
     <p:extLst>
       <p:ext uri="{BB962C8B-B14F-4D97-AF65-F5344CB8AC3E}">
-        <p14:creationId xmlns:p14="http://schemas.microsoft.com/office/powerpoint/2010/main" val="1421168158"/>
+        <p14:creationId xmlns:p14="http://schemas.microsoft.com/office/powerpoint/2010/main" val="146655575"/>
       </p:ext>
     </p:extLst>
   </p:cSld>
@@ -12929,7 +12999,7 @@
           <p:cNvPr id="2" name="Title 1">
             <a:extLst>
               <a:ext uri="{FF2B5EF4-FFF2-40B4-BE49-F238E27FC236}">
-                <a16:creationId xmlns:a16="http://schemas.microsoft.com/office/drawing/2014/main" id="{8E7FDDD9-1C92-4F98-AD9E-C0A04C2FF4F1}"/>
+                <a16:creationId xmlns:a16="http://schemas.microsoft.com/office/drawing/2014/main" id="{D6ED6944-D8CA-45F7-A54E-60E892D23081}"/>
               </a:ext>
             </a:extLst>
           </p:cNvPr>
@@ -12947,7 +13017,7 @@
           <a:p>
             <a:r>
               <a:rPr lang="en-US" dirty="0"/>
-              <a:t>Streaming vs batching vs history</a:t>
+              <a:t>Performance - streaming</a:t>
             </a:r>
           </a:p>
         </p:txBody>
@@ -12957,7 +13027,7 @@
           <p:cNvPr id="3" name="Content Placeholder 2">
             <a:extLst>
               <a:ext uri="{FF2B5EF4-FFF2-40B4-BE49-F238E27FC236}">
-                <a16:creationId xmlns:a16="http://schemas.microsoft.com/office/drawing/2014/main" id="{0C50E380-B816-4A32-BE9D-5257489DB456}"/>
+                <a16:creationId xmlns:a16="http://schemas.microsoft.com/office/drawing/2014/main" id="{EFA470FE-90EB-44EA-8722-0FC54521352C}"/>
               </a:ext>
             </a:extLst>
           </p:cNvPr>
@@ -12970,62 +13040,38 @@
         </p:nvSpPr>
         <p:spPr>
           <a:xfrm>
-            <a:off x="1141412" y="1959429"/>
-            <a:ext cx="9905999" cy="3831772"/>
+            <a:off x="1023257" y="2249487"/>
+            <a:ext cx="10156371" cy="3541714"/>
           </a:xfrm>
         </p:spPr>
         <p:txBody>
-          <a:bodyPr/>
+          <a:bodyPr>
+            <a:normAutofit/>
+          </a:bodyPr>
           <a:lstStyle/>
           <a:p>
             <a:r>
               <a:rPr lang="en-US" dirty="0"/>
-              <a:t>Streaming allows for the intake of twitter data in real time</a:t>
+              <a:t>Streaming requires the program to be active, which does greatly limit practicality in events of a crash</a:t>
+            </a:r>
+          </a:p>
+          <a:p>
+            <a:r>
+              <a:rPr lang="en-US" dirty="0"/>
+              <a:t>Being limited by program uptime also greatly limits the amount of data that can be collected in reasonable periods of time</a:t>
+            </a:r>
+          </a:p>
+          <a:p>
+            <a:r>
+              <a:rPr lang="en-US" dirty="0"/>
+              <a:t>There is a rate limiter in place for tweet streaming so some data may be missed</a:t>
             </a:r>
           </a:p>
           <a:p>
             <a:pPr lvl="1"/>
             <a:r>
               <a:rPr lang="en-US" dirty="0"/>
-              <a:t>This allows for broader searches where a user can take in data by text, hashtags, </a:t>
-            </a:r>
-            <a:r>
-              <a:rPr lang="en-US" dirty="0" err="1"/>
-              <a:t>etc</a:t>
-            </a:r>
-            <a:endParaRPr lang="en-US" dirty="0"/>
-          </a:p>
-          <a:p>
-            <a:pPr lvl="1"/>
-            <a:r>
-              <a:rPr lang="en-US" dirty="0"/>
-              <a:t>Allows the ability to quickly get a pulse for activity</a:t>
-            </a:r>
-          </a:p>
-          <a:p>
-            <a:r>
-              <a:rPr lang="en-US" dirty="0"/>
-              <a:t>Batching twitter data often involves pulling historical data from defined users</a:t>
-            </a:r>
-          </a:p>
-          <a:p>
-            <a:pPr lvl="1"/>
-            <a:r>
-              <a:rPr lang="en-US" dirty="0"/>
-              <a:t>This somewhat limits the scope since getting historical hashtag data is nearly impossible</a:t>
-            </a:r>
-          </a:p>
-          <a:p>
-            <a:r>
-              <a:rPr lang="en-US" dirty="0"/>
-              <a:t>History</a:t>
-            </a:r>
-          </a:p>
-          <a:p>
-            <a:pPr lvl="1"/>
-            <a:r>
-              <a:rPr lang="en-US" dirty="0"/>
-              <a:t>Can be purchased through an enterprise license, not available freely without restrictions</a:t>
+              <a:t>30 requests/min or 10 requests/sec</a:t>
             </a:r>
           </a:p>
         </p:txBody>
@@ -13033,7 +13079,7 @@
     </p:spTree>
     <p:extLst>
       <p:ext uri="{BB962C8B-B14F-4D97-AF65-F5344CB8AC3E}">
-        <p14:creationId xmlns:p14="http://schemas.microsoft.com/office/powerpoint/2010/main" val="146655575"/>
+        <p14:creationId xmlns:p14="http://schemas.microsoft.com/office/powerpoint/2010/main" val="4216146171"/>
       </p:ext>
     </p:extLst>
   </p:cSld>
@@ -13083,7 +13129,7 @@
           <a:p>
             <a:r>
               <a:rPr lang="en-US" dirty="0"/>
-              <a:t>performance</a:t>
+              <a:t>Performance - Batch</a:t>
             </a:r>
           </a:p>
         </p:txBody>
@@ -13111,26 +13157,7 @@
           <a:p>
             <a:r>
               <a:rPr lang="en-US" dirty="0"/>
-              <a:t>Practicality of streaming forever….</a:t>
-            </a:r>
-          </a:p>
-          <a:p>
-            <a:r>
-              <a:rPr lang="en-US" dirty="0"/>
-              <a:t>Scalability of mongo</a:t>
-            </a:r>
-          </a:p>
-          <a:p>
-            <a:r>
-              <a:rPr lang="en-US" dirty="0"/>
-              <a:t>Being kicked for overpulling</a:t>
-            </a:r>
-          </a:p>
-          <a:p>
-            <a:pPr lvl="1"/>
-            <a:r>
-              <a:rPr lang="en-US" dirty="0"/>
-              <a:t>Twitter does have failsafe protocols in place to ensure “bad actors” don’t overload there server</a:t>
+              <a:t>Bat</a:t>
             </a:r>
           </a:p>
         </p:txBody>
@@ -13138,7 +13165,7 @@
     </p:spTree>
     <p:extLst>
       <p:ext uri="{BB962C8B-B14F-4D97-AF65-F5344CB8AC3E}">
-        <p14:creationId xmlns:p14="http://schemas.microsoft.com/office/powerpoint/2010/main" val="4216146171"/>
+        <p14:creationId xmlns:p14="http://schemas.microsoft.com/office/powerpoint/2010/main" val="2586301821"/>
       </p:ext>
     </p:extLst>
   </p:cSld>
@@ -13149,6 +13176,89 @@
 </file>
 
 <file path=ppt/slides/slide8.xml><?xml version="1.0" encoding="utf-8"?>
+<p:sld xmlns:a="http://schemas.openxmlformats.org/drawingml/2006/main" xmlns:r="http://schemas.openxmlformats.org/officeDocument/2006/relationships" xmlns:p="http://schemas.openxmlformats.org/presentationml/2006/main">
+  <p:cSld>
+    <p:spTree>
+      <p:nvGrpSpPr>
+        <p:cNvPr id="1" name=""/>
+        <p:cNvGrpSpPr/>
+        <p:nvPr/>
+      </p:nvGrpSpPr>
+      <p:grpSpPr>
+        <a:xfrm>
+          <a:off x="0" y="0"/>
+          <a:ext cx="0" cy="0"/>
+          <a:chOff x="0" y="0"/>
+          <a:chExt cx="0" cy="0"/>
+        </a:xfrm>
+      </p:grpSpPr>
+      <p:sp>
+        <p:nvSpPr>
+          <p:cNvPr id="2" name="Title 1">
+            <a:extLst>
+              <a:ext uri="{FF2B5EF4-FFF2-40B4-BE49-F238E27FC236}">
+                <a16:creationId xmlns:a16="http://schemas.microsoft.com/office/drawing/2014/main" id="{8E7FDDD9-1C92-4F98-AD9E-C0A04C2FF4F1}"/>
+              </a:ext>
+            </a:extLst>
+          </p:cNvPr>
+          <p:cNvSpPr>
+            <a:spLocks noGrp="1"/>
+          </p:cNvSpPr>
+          <p:nvPr>
+            <p:ph type="title"/>
+          </p:nvPr>
+        </p:nvSpPr>
+        <p:spPr/>
+        <p:txBody>
+          <a:bodyPr/>
+          <a:lstStyle/>
+          <a:p>
+            <a:r>
+              <a:rPr lang="en-US" dirty="0"/>
+              <a:t>How the code works</a:t>
+            </a:r>
+          </a:p>
+        </p:txBody>
+      </p:sp>
+      <p:sp>
+        <p:nvSpPr>
+          <p:cNvPr id="3" name="Content Placeholder 2">
+            <a:extLst>
+              <a:ext uri="{FF2B5EF4-FFF2-40B4-BE49-F238E27FC236}">
+                <a16:creationId xmlns:a16="http://schemas.microsoft.com/office/drawing/2014/main" id="{0C50E380-B816-4A32-BE9D-5257489DB456}"/>
+              </a:ext>
+            </a:extLst>
+          </p:cNvPr>
+          <p:cNvSpPr>
+            <a:spLocks noGrp="1"/>
+          </p:cNvSpPr>
+          <p:nvPr>
+            <p:ph idx="1"/>
+          </p:nvPr>
+        </p:nvSpPr>
+        <p:spPr/>
+        <p:txBody>
+          <a:bodyPr/>
+          <a:lstStyle/>
+          <a:p>
+            <a:endParaRPr lang="en-US" dirty="0"/>
+          </a:p>
+        </p:txBody>
+      </p:sp>
+    </p:spTree>
+    <p:extLst>
+      <p:ext uri="{BB962C8B-B14F-4D97-AF65-F5344CB8AC3E}">
+        <p14:creationId xmlns:p14="http://schemas.microsoft.com/office/powerpoint/2010/main" val="1421168158"/>
+      </p:ext>
+    </p:extLst>
+  </p:cSld>
+  <p:clrMapOvr>
+    <a:masterClrMapping/>
+  </p:clrMapOvr>
+</p:sld>
+</file>
+
+<file path=ppt/slides/slide9.xml><?xml version="1.0" encoding="utf-8"?>
 <p:sld xmlns:a="http://schemas.openxmlformats.org/drawingml/2006/main" xmlns:r="http://schemas.openxmlformats.org/officeDocument/2006/relationships" xmlns:p="http://schemas.openxmlformats.org/presentationml/2006/main">
   <p:cSld>
     <p:spTree>

</xml_diff>